<commit_message>
A small usermanual update - screens now look like as original
</commit_message>
<xml_diff>
--- a/Documents/NProject.pptx
+++ b/Documents/NProject.pptx
@@ -7364,8 +7364,9 @@
             </a:pPr>
             <a:r>
               <a:rPr lang="en-US" dirty="0" smtClean="0"/>
-              <a:t>MS Project</a:t>
-            </a:r>
+              <a:t>Team Foundation Server</a:t>
+            </a:r>
+            <a:endParaRPr lang="en-US" dirty="0" smtClean="0"/>
           </a:p>
           <a:p>
             <a:pPr marL="742950" lvl="1" indent="-285750">
@@ -7381,13 +7382,24 @@
                   <a:srgbClr val="FFC000"/>
                 </a:solidFill>
               </a:rPr>
-              <a:t>Платное решение, неудобно для коллективной работы</a:t>
-            </a:r>
-            <a:endParaRPr lang="en-US" dirty="0" smtClean="0">
-              <a:solidFill>
-                <a:srgbClr val="FFC000"/>
-              </a:solidFill>
-            </a:endParaRPr>
+              <a:t>Платное решение, </a:t>
+            </a:r>
+            <a:r>
+              <a:rPr lang="ru-RU" dirty="0" smtClean="0">
+                <a:solidFill>
+                  <a:srgbClr val="FFC000"/>
+                </a:solidFill>
+              </a:rPr>
+              <a:t>сильно интегрировано в </a:t>
+            </a:r>
+            <a:r>
+              <a:rPr lang="en-US" dirty="0" smtClean="0">
+                <a:solidFill>
+                  <a:srgbClr val="FFC000"/>
+                </a:solidFill>
+              </a:rPr>
+              <a:t>Visual Studio</a:t>
+            </a:r>
           </a:p>
           <a:p>
             <a:pPr marL="285750" indent="-285750">

</xml_diff>

<commit_message>
RELEASE 1.0. All docs are up-to-date
</commit_message>
<xml_diff>
--- a/Documents/NProject.pptx
+++ b/Documents/NProject.pptx
@@ -630,7 +630,7 @@
           <a:p>
             <a:fld id="{2A984AF2-ED5D-4B1F-B37B-93ED314CE0AF}" type="datetimeFigureOut">
               <a:rPr lang="ru-RU" smtClean="0"/>
-              <a:t>07.07.2011</a:t>
+              <a:t>08.07.2011</a:t>
             </a:fld>
             <a:endParaRPr lang="ru-RU"/>
           </a:p>
@@ -1152,7 +1152,7 @@
           <a:p>
             <a:fld id="{2A984AF2-ED5D-4B1F-B37B-93ED314CE0AF}" type="datetimeFigureOut">
               <a:rPr lang="ru-RU" smtClean="0"/>
-              <a:t>07.07.2011</a:t>
+              <a:t>08.07.2011</a:t>
             </a:fld>
             <a:endParaRPr lang="ru-RU"/>
           </a:p>
@@ -1670,7 +1670,7 @@
           <a:p>
             <a:fld id="{2A984AF2-ED5D-4B1F-B37B-93ED314CE0AF}" type="datetimeFigureOut">
               <a:rPr lang="ru-RU" smtClean="0"/>
-              <a:t>07.07.2011</a:t>
+              <a:t>08.07.2011</a:t>
             </a:fld>
             <a:endParaRPr lang="ru-RU"/>
           </a:p>
@@ -2184,7 +2184,7 @@
           <a:p>
             <a:fld id="{2A984AF2-ED5D-4B1F-B37B-93ED314CE0AF}" type="datetimeFigureOut">
               <a:rPr lang="ru-RU" smtClean="0"/>
-              <a:t>07.07.2011</a:t>
+              <a:t>08.07.2011</a:t>
             </a:fld>
             <a:endParaRPr lang="ru-RU"/>
           </a:p>
@@ -2764,7 +2764,7 @@
           <a:p>
             <a:fld id="{2A984AF2-ED5D-4B1F-B37B-93ED314CE0AF}" type="datetimeFigureOut">
               <a:rPr lang="ru-RU" smtClean="0"/>
-              <a:t>07.07.2011</a:t>
+              <a:t>08.07.2011</a:t>
             </a:fld>
             <a:endParaRPr lang="ru-RU"/>
           </a:p>
@@ -3391,7 +3391,7 @@
           <a:p>
             <a:fld id="{2A984AF2-ED5D-4B1F-B37B-93ED314CE0AF}" type="datetimeFigureOut">
               <a:rPr lang="ru-RU" smtClean="0"/>
-              <a:t>07.07.2011</a:t>
+              <a:t>08.07.2011</a:t>
             </a:fld>
             <a:endParaRPr lang="ru-RU"/>
           </a:p>
@@ -4156,7 +4156,7 @@
           <a:p>
             <a:fld id="{2A984AF2-ED5D-4B1F-B37B-93ED314CE0AF}" type="datetimeFigureOut">
               <a:rPr lang="ru-RU" smtClean="0"/>
-              <a:t>07.07.2011</a:t>
+              <a:t>08.07.2011</a:t>
             </a:fld>
             <a:endParaRPr lang="ru-RU"/>
           </a:p>
@@ -4613,7 +4613,7 @@
           <a:p>
             <a:fld id="{2A984AF2-ED5D-4B1F-B37B-93ED314CE0AF}" type="datetimeFigureOut">
               <a:rPr lang="ru-RU" smtClean="0"/>
-              <a:t>07.07.2011</a:t>
+              <a:t>08.07.2011</a:t>
             </a:fld>
             <a:endParaRPr lang="ru-RU"/>
           </a:p>
@@ -5038,7 +5038,7 @@
           <a:p>
             <a:fld id="{2A984AF2-ED5D-4B1F-B37B-93ED314CE0AF}" type="datetimeFigureOut">
               <a:rPr lang="ru-RU" smtClean="0"/>
-              <a:t>07.07.2011</a:t>
+              <a:t>08.07.2011</a:t>
             </a:fld>
             <a:endParaRPr lang="ru-RU"/>
           </a:p>
@@ -5655,7 +5655,7 @@
           <a:p>
             <a:fld id="{2A984AF2-ED5D-4B1F-B37B-93ED314CE0AF}" type="datetimeFigureOut">
               <a:rPr lang="ru-RU" smtClean="0"/>
-              <a:t>07.07.2011</a:t>
+              <a:t>08.07.2011</a:t>
             </a:fld>
             <a:endParaRPr lang="ru-RU"/>
           </a:p>
@@ -6271,7 +6271,7 @@
           <a:p>
             <a:fld id="{2A984AF2-ED5D-4B1F-B37B-93ED314CE0AF}" type="datetimeFigureOut">
               <a:rPr lang="ru-RU" smtClean="0"/>
-              <a:t>07.07.2011</a:t>
+              <a:t>08.07.2011</a:t>
             </a:fld>
             <a:endParaRPr lang="ru-RU"/>
           </a:p>
@@ -6532,7 +6532,7 @@
           <a:p>
             <a:fld id="{2A984AF2-ED5D-4B1F-B37B-93ED314CE0AF}" type="datetimeFigureOut">
               <a:rPr lang="ru-RU" smtClean="0"/>
-              <a:t>07.07.2011</a:t>
+              <a:t>08.07.2011</a:t>
             </a:fld>
             <a:endParaRPr lang="ru-RU"/>
           </a:p>
@@ -7366,7 +7366,6 @@
               <a:rPr lang="en-US" dirty="0" smtClean="0"/>
               <a:t>Team Foundation Server</a:t>
             </a:r>
-            <a:endParaRPr lang="en-US" dirty="0" smtClean="0"/>
           </a:p>
           <a:p>
             <a:pPr marL="742950" lvl="1" indent="-285750">
@@ -7382,15 +7381,7 @@
                   <a:srgbClr val="FFC000"/>
                 </a:solidFill>
               </a:rPr>
-              <a:t>Платное решение, </a:t>
-            </a:r>
-            <a:r>
-              <a:rPr lang="ru-RU" dirty="0" smtClean="0">
-                <a:solidFill>
-                  <a:srgbClr val="FFC000"/>
-                </a:solidFill>
-              </a:rPr>
-              <a:t>сильно интегрировано в </a:t>
+              <a:t>Платное решение, сильно интегрировано в </a:t>
             </a:r>
             <a:r>
               <a:rPr lang="en-US" dirty="0" smtClean="0">
@@ -8128,8 +8119,8 @@
         </p:nvSpPr>
         <p:spPr>
           <a:xfrm>
-            <a:off x="1403648" y="2924944"/>
-            <a:ext cx="7056784" cy="2308324"/>
+            <a:off x="1400913" y="2573819"/>
+            <a:ext cx="7056784" cy="2862322"/>
           </a:xfrm>
           <a:prstGeom prst="rect">
             <a:avLst/>
@@ -8179,6 +8170,21 @@
               <a:rPr lang="ru-RU" sz="2400" dirty="0" smtClean="0"/>
               <a:t>Топ-менеджер</a:t>
             </a:r>
+            <a:endParaRPr lang="en-US" sz="2400" dirty="0" smtClean="0"/>
+          </a:p>
+          <a:p>
+            <a:pPr marL="285750" indent="-285750">
+              <a:lnSpc>
+                <a:spcPct val="150000"/>
+              </a:lnSpc>
+              <a:buFont typeface="Wingdings" pitchFamily="2" charset="2"/>
+              <a:buChar char="Ø"/>
+            </a:pPr>
+            <a:r>
+              <a:rPr lang="ru-RU" sz="2400" dirty="0" smtClean="0"/>
+              <a:t>Программист</a:t>
+            </a:r>
+            <a:endParaRPr lang="ru-RU" sz="2400" dirty="0" smtClean="0"/>
           </a:p>
           <a:p>
             <a:pPr marL="285750" indent="-285750">

</xml_diff>